<commit_message>
Ajout d'afficher le panneau de victoire
</commit_message>
<xml_diff>
--- a/docs/2d_trigger_porte/2d_trigger_porte.pptx
+++ b/docs/2d_trigger_porte/2d_trigger_porte.pptx
@@ -9,6 +9,7 @@
     <p:sldId id="258" r:id="rId3"/>
     <p:sldId id="259" r:id="rId4"/>
     <p:sldId id="260" r:id="rId5"/>
+    <p:sldId id="261" r:id="rId6"/>
   </p:sldIdLst>
   <p:sldSz cx="12192000" cy="6858000"/>
   <p:notesSz cx="6858000" cy="9144000"/>
@@ -107,13 +108,18 @@
       </a:defRPr>
     </a:lvl9pPr>
   </p:defaultTextStyle>
+  <p:extLst>
+    <p:ext uri="{EFAFB233-063F-42B5-8137-9DF3F51BA10A}">
+      <p15:sldGuideLst xmlns:p15="http://schemas.microsoft.com/office/powerpoint/2012/main"/>
+    </p:ext>
+  </p:extLst>
 </p:presentation>
 </file>
 
 <file path=ppt/revisionInfo.xml><?xml version="1.0" encoding="utf-8"?>
 <p1510:revInfo xmlns:a="http://schemas.openxmlformats.org/drawingml/2006/main" xmlns:r="http://schemas.openxmlformats.org/officeDocument/2006/relationships" xmlns:p1510="http://schemas.microsoft.com/office/powerpoint/2015/10/main">
   <p1510:revLst>
-    <p1510:client id="{CABF14D8-06AA-41DF-B78D-B6E8E6C12B84}" v="25" dt="2022-10-17T17:33:14.193"/>
+    <p1510:client id="{CABF14D8-06AA-41DF-B78D-B6E8E6C12B84}" v="28" dt="2022-10-17T18:16:31.230"/>
   </p1510:revLst>
 </p1510:revInfo>
 </file>
@@ -123,7 +129,7 @@
   <pc:docChgLst>
     <pc:chgData name="Thomas O Fredericks" userId="9a40f032a9b16fc7" providerId="LiveId" clId="{CABF14D8-06AA-41DF-B78D-B6E8E6C12B84}"/>
     <pc:docChg chg="undo redo custSel addSld delSld modSld">
-      <pc:chgData name="Thomas O Fredericks" userId="9a40f032a9b16fc7" providerId="LiveId" clId="{CABF14D8-06AA-41DF-B78D-B6E8E6C12B84}" dt="2022-10-17T17:33:46.775" v="429" actId="404"/>
+      <pc:chgData name="Thomas O Fredericks" userId="9a40f032a9b16fc7" providerId="LiveId" clId="{CABF14D8-06AA-41DF-B78D-B6E8E6C12B84}" dt="2022-10-17T18:16:34.646" v="433" actId="1076"/>
       <pc:docMkLst>
         <pc:docMk/>
       </pc:docMkLst>
@@ -311,6 +317,29 @@
             <pc:docMk/>
             <pc:sldMk cId="3008812815" sldId="260"/>
             <ac:picMk id="2" creationId="{05625ADD-E79D-452E-92BE-C05B6DCA7D0C}"/>
+          </ac:picMkLst>
+        </pc:picChg>
+      </pc:sldChg>
+      <pc:sldChg chg="addSp modSp add">
+        <pc:chgData name="Thomas O Fredericks" userId="9a40f032a9b16fc7" providerId="LiveId" clId="{CABF14D8-06AA-41DF-B78D-B6E8E6C12B84}" dt="2022-10-17T18:16:34.646" v="433" actId="1076"/>
+        <pc:sldMkLst>
+          <pc:docMk/>
+          <pc:sldMk cId="3918962931" sldId="261"/>
+        </pc:sldMkLst>
+        <pc:spChg chg="add mod">
+          <ac:chgData name="Thomas O Fredericks" userId="9a40f032a9b16fc7" providerId="LiveId" clId="{CABF14D8-06AA-41DF-B78D-B6E8E6C12B84}" dt="2022-10-17T18:16:34.646" v="433" actId="1076"/>
+          <ac:spMkLst>
+            <pc:docMk/>
+            <pc:sldMk cId="3918962931" sldId="261"/>
+            <ac:spMk id="3" creationId="{31437C2C-8EDA-4789-A411-4D26AA30F92B}"/>
+          </ac:spMkLst>
+        </pc:spChg>
+        <pc:picChg chg="add">
+          <ac:chgData name="Thomas O Fredericks" userId="9a40f032a9b16fc7" providerId="LiveId" clId="{CABF14D8-06AA-41DF-B78D-B6E8E6C12B84}" dt="2022-10-17T18:16:27.783" v="431"/>
+          <ac:picMkLst>
+            <pc:docMk/>
+            <pc:sldMk cId="3918962931" sldId="261"/>
+            <ac:picMk id="2" creationId="{0B6B2D0E-E174-40DA-BB77-718226D49760}"/>
           </ac:picMkLst>
         </pc:picChg>
       </pc:sldChg>
@@ -4468,6 +4497,115 @@
 </p:sld>
 </file>
 
+<file path=ppt/slides/slide5.xml><?xml version="1.0" encoding="utf-8"?>
+<p:sld xmlns:a="http://schemas.openxmlformats.org/drawingml/2006/main" xmlns:r="http://schemas.openxmlformats.org/officeDocument/2006/relationships" xmlns:p="http://schemas.openxmlformats.org/presentationml/2006/main">
+  <p:cSld>
+    <p:spTree>
+      <p:nvGrpSpPr>
+        <p:cNvPr id="1" name=""/>
+        <p:cNvGrpSpPr/>
+        <p:nvPr/>
+      </p:nvGrpSpPr>
+      <p:grpSpPr>
+        <a:xfrm>
+          <a:off x="0" y="0"/>
+          <a:ext cx="0" cy="0"/>
+          <a:chOff x="0" y="0"/>
+          <a:chExt cx="0" cy="0"/>
+        </a:xfrm>
+      </p:grpSpPr>
+      <p:pic>
+        <p:nvPicPr>
+          <p:cNvPr id="2" name="Image 1">
+            <a:extLst>
+              <a:ext uri="{FF2B5EF4-FFF2-40B4-BE49-F238E27FC236}">
+                <a16:creationId xmlns:a16="http://schemas.microsoft.com/office/drawing/2014/main" id="{0B6B2D0E-E174-40DA-BB77-718226D49760}"/>
+              </a:ext>
+            </a:extLst>
+          </p:cNvPr>
+          <p:cNvPicPr>
+            <a:picLocks noChangeAspect="1"/>
+          </p:cNvPicPr>
+          <p:nvPr/>
+        </p:nvPicPr>
+        <p:blipFill>
+          <a:blip r:embed="rId2"/>
+          <a:stretch>
+            <a:fillRect/>
+          </a:stretch>
+        </p:blipFill>
+        <p:spPr>
+          <a:xfrm>
+            <a:off x="3642970" y="1719024"/>
+            <a:ext cx="4906060" cy="3419952"/>
+          </a:xfrm>
+          <a:prstGeom prst="rect">
+            <a:avLst/>
+          </a:prstGeom>
+        </p:spPr>
+      </p:pic>
+      <p:sp>
+        <p:nvSpPr>
+          <p:cNvPr id="3" name="Flèche : droite 2">
+            <a:extLst>
+              <a:ext uri="{FF2B5EF4-FFF2-40B4-BE49-F238E27FC236}">
+                <a16:creationId xmlns:a16="http://schemas.microsoft.com/office/drawing/2014/main" id="{31437C2C-8EDA-4789-A411-4D26AA30F92B}"/>
+              </a:ext>
+            </a:extLst>
+          </p:cNvPr>
+          <p:cNvSpPr/>
+          <p:nvPr/>
+        </p:nvSpPr>
+        <p:spPr>
+          <a:xfrm>
+            <a:off x="3417587" y="3122256"/>
+            <a:ext cx="566734" cy="208053"/>
+          </a:xfrm>
+          <a:prstGeom prst="rightArrow">
+            <a:avLst/>
+          </a:prstGeom>
+          <a:ln>
+            <a:noFill/>
+          </a:ln>
+        </p:spPr>
+        <p:style>
+          <a:lnRef idx="2">
+            <a:schemeClr val="accent1">
+              <a:shade val="50000"/>
+            </a:schemeClr>
+          </a:lnRef>
+          <a:fillRef idx="1">
+            <a:schemeClr val="accent1"/>
+          </a:fillRef>
+          <a:effectRef idx="0">
+            <a:schemeClr val="accent1"/>
+          </a:effectRef>
+          <a:fontRef idx="minor">
+            <a:schemeClr val="lt1"/>
+          </a:fontRef>
+        </p:style>
+        <p:txBody>
+          <a:bodyPr rtlCol="0" anchor="ctr"/>
+          <a:lstStyle/>
+          <a:p>
+            <a:pPr algn="ctr"/>
+            <a:endParaRPr lang="fr-CA"/>
+          </a:p>
+        </p:txBody>
+      </p:sp>
+    </p:spTree>
+    <p:extLst>
+      <p:ext uri="{BB962C8B-B14F-4D97-AF65-F5344CB8AC3E}">
+        <p14:creationId xmlns:p14="http://schemas.microsoft.com/office/powerpoint/2010/main" val="3918962931"/>
+      </p:ext>
+    </p:extLst>
+  </p:cSld>
+  <p:clrMapOvr>
+    <a:masterClrMapping/>
+  </p:clrMapOvr>
+</p:sld>
+</file>
+
 <file path=ppt/theme/theme1.xml><?xml version="1.0" encoding="utf-8"?>
 <a:theme xmlns:a="http://schemas.openxmlformats.org/drawingml/2006/main" name="Thème Office">
   <a:themeElements>

</xml_diff>